<commit_message>
Edited the powerpoint a bit more
</commit_message>
<xml_diff>
--- a/LEVEL 4 & 5.pptx
+++ b/LEVEL 4 & 5.pptx
@@ -8,6 +8,15 @@
   <p:sldIdLst>
     <p:sldId id="256" r:id="rId3"/>
     <p:sldId id="257" r:id="rId4"/>
+    <p:sldId id="258" r:id="rId5"/>
+    <p:sldId id="259" r:id="rId6"/>
+    <p:sldId id="264" r:id="rId7"/>
+    <p:sldId id="260" r:id="rId8"/>
+    <p:sldId id="261" r:id="rId9"/>
+    <p:sldId id="265" r:id="rId10"/>
+    <p:sldId id="263" r:id="rId11"/>
+    <p:sldId id="266" r:id="rId12"/>
+    <p:sldId id="262" r:id="rId13"/>
   </p:sldIdLst>
   <p:sldSz cx="12192000" cy="6858000"/>
   <p:notesSz cx="6858000" cy="9144000"/>
@@ -106,11 +115,16 @@
       </a:defRPr>
     </a:lvl9pPr>
   </p:defaultTextStyle>
+  <p:extLst>
+    <p:ext uri="{EFAFB233-063F-42B5-8137-9DF3F51BA10A}">
+      <p15:sldGuideLst xmlns:p15="http://schemas.microsoft.com/office/powerpoint/2012/main"/>
+    </p:ext>
+  </p:extLst>
 </p:presentation>
 </file>
 
 <file path=ppt/slideLayouts/slideLayout1.xml><?xml version="1.0" encoding="utf-8"?>
-<p:sldLayout xmlns:a="http://schemas.openxmlformats.org/drawingml/2006/main" xmlns:r="http://schemas.openxmlformats.org/officeDocument/2006/relationships" xmlns:p="http://schemas.openxmlformats.org/presentationml/2006/main" showMasterSp="0" type="title" preserve="1">
+<p:sldLayout xmlns:a="http://schemas.openxmlformats.org/drawingml/2006/main" xmlns:r="http://schemas.openxmlformats.org/officeDocument/2006/relationships" xmlns:p="http://schemas.openxmlformats.org/presentationml/2006/main" type="title" preserve="1">
   <p:cSld name="Title Slide">
     <p:spTree>
       <p:nvGrpSpPr>
@@ -300,7 +314,7 @@
           <a:p>
             <a:fld id="{0E520F00-71AE-4099-9421-19B948D8B007}" type="datetimeFigureOut">
               <a:rPr lang="en-GB" smtClean="0"/>
-              <a:t>05/02/2018</a:t>
+              <a:t>06/02/2018</a:t>
             </a:fld>
             <a:endParaRPr lang="en-GB"/>
           </a:p>
@@ -736,7 +750,7 @@
           <a:p>
             <a:fld id="{0E520F00-71AE-4099-9421-19B948D8B007}" type="datetimeFigureOut">
               <a:rPr lang="en-GB" smtClean="0"/>
-              <a:t>05/02/2018</a:t>
+              <a:t>06/02/2018</a:t>
             </a:fld>
             <a:endParaRPr lang="en-GB"/>
           </a:p>
@@ -986,7 +1000,7 @@
           <a:p>
             <a:fld id="{0E520F00-71AE-4099-9421-19B948D8B007}" type="datetimeFigureOut">
               <a:rPr lang="en-GB" smtClean="0"/>
-              <a:t>05/02/2018</a:t>
+              <a:t>06/02/2018</a:t>
             </a:fld>
             <a:endParaRPr lang="en-GB"/>
           </a:p>
@@ -1294,7 +1308,7 @@
           <a:p>
             <a:fld id="{0E520F00-71AE-4099-9421-19B948D8B007}" type="datetimeFigureOut">
               <a:rPr lang="en-GB" smtClean="0"/>
-              <a:t>05/02/2018</a:t>
+              <a:t>06/02/2018</a:t>
             </a:fld>
             <a:endParaRPr lang="en-GB"/>
           </a:p>
@@ -1612,7 +1626,7 @@
           <a:p>
             <a:fld id="{0E520F00-71AE-4099-9421-19B948D8B007}" type="datetimeFigureOut">
               <a:rPr lang="en-GB" smtClean="0"/>
-              <a:t>05/02/2018</a:t>
+              <a:t>06/02/2018</a:t>
             </a:fld>
             <a:endParaRPr lang="en-GB"/>
           </a:p>
@@ -1914,7 +1928,7 @@
           <a:p>
             <a:fld id="{0E520F00-71AE-4099-9421-19B948D8B007}" type="datetimeFigureOut">
               <a:rPr lang="en-GB" smtClean="0"/>
-              <a:t>05/02/2018</a:t>
+              <a:t>06/02/2018</a:t>
             </a:fld>
             <a:endParaRPr lang="en-GB"/>
           </a:p>
@@ -2281,7 +2295,7 @@
           <a:p>
             <a:fld id="{0E520F00-71AE-4099-9421-19B948D8B007}" type="datetimeFigureOut">
               <a:rPr lang="en-GB" smtClean="0"/>
-              <a:t>05/02/2018</a:t>
+              <a:t>06/02/2018</a:t>
             </a:fld>
             <a:endParaRPr lang="en-GB"/>
           </a:p>
@@ -2455,7 +2469,7 @@
           <a:p>
             <a:fld id="{0E520F00-71AE-4099-9421-19B948D8B007}" type="datetimeFigureOut">
               <a:rPr lang="en-GB" smtClean="0"/>
-              <a:t>05/02/2018</a:t>
+              <a:t>06/02/2018</a:t>
             </a:fld>
             <a:endParaRPr lang="en-GB"/>
           </a:p>
@@ -2635,7 +2649,7 @@
           <a:p>
             <a:fld id="{0E520F00-71AE-4099-9421-19B948D8B007}" type="datetimeFigureOut">
               <a:rPr lang="en-GB" smtClean="0"/>
-              <a:t>05/02/2018</a:t>
+              <a:t>06/02/2018</a:t>
             </a:fld>
             <a:endParaRPr lang="en-GB"/>
           </a:p>
@@ -2892,7 +2906,7 @@
           <a:p>
             <a:fld id="{0E520F00-71AE-4099-9421-19B948D8B007}" type="datetimeFigureOut">
               <a:rPr lang="en-GB" smtClean="0"/>
-              <a:t>05/02/2018</a:t>
+              <a:t>06/02/2018</a:t>
             </a:fld>
             <a:endParaRPr lang="en-GB"/>
           </a:p>
@@ -3062,7 +3076,7 @@
           <a:p>
             <a:fld id="{0E520F00-71AE-4099-9421-19B948D8B007}" type="datetimeFigureOut">
               <a:rPr lang="en-GB" smtClean="0"/>
-              <a:t>05/02/2018</a:t>
+              <a:t>06/02/2018</a:t>
             </a:fld>
             <a:endParaRPr lang="en-GB"/>
           </a:p>
@@ -3232,7 +3246,7 @@
           <a:p>
             <a:fld id="{0E520F00-71AE-4099-9421-19B948D8B007}" type="datetimeFigureOut">
               <a:rPr lang="en-GB" smtClean="0"/>
-              <a:t>05/02/2018</a:t>
+              <a:t>06/02/2018</a:t>
             </a:fld>
             <a:endParaRPr lang="en-GB"/>
           </a:p>
@@ -3489,7 +3503,7 @@
           <a:p>
             <a:fld id="{0E520F00-71AE-4099-9421-19B948D8B007}" type="datetimeFigureOut">
               <a:rPr lang="en-GB" smtClean="0"/>
-              <a:t>05/02/2018</a:t>
+              <a:t>06/02/2018</a:t>
             </a:fld>
             <a:endParaRPr lang="en-GB"/>
           </a:p>
@@ -3721,7 +3735,7 @@
           <a:p>
             <a:fld id="{0E520F00-71AE-4099-9421-19B948D8B007}" type="datetimeFigureOut">
               <a:rPr lang="en-GB" smtClean="0"/>
-              <a:t>05/02/2018</a:t>
+              <a:t>06/02/2018</a:t>
             </a:fld>
             <a:endParaRPr lang="en-GB"/>
           </a:p>
@@ -4114,7 +4128,7 @@
           <a:p>
             <a:fld id="{0E520F00-71AE-4099-9421-19B948D8B007}" type="datetimeFigureOut">
               <a:rPr lang="en-GB" smtClean="0"/>
-              <a:t>05/02/2018</a:t>
+              <a:t>06/02/2018</a:t>
             </a:fld>
             <a:endParaRPr lang="en-GB"/>
           </a:p>
@@ -4232,7 +4246,7 @@
           <a:p>
             <a:fld id="{0E520F00-71AE-4099-9421-19B948D8B007}" type="datetimeFigureOut">
               <a:rPr lang="en-GB" smtClean="0"/>
-              <a:t>05/02/2018</a:t>
+              <a:t>06/02/2018</a:t>
             </a:fld>
             <a:endParaRPr lang="en-GB"/>
           </a:p>
@@ -4327,7 +4341,7 @@
           <a:p>
             <a:fld id="{0E520F00-71AE-4099-9421-19B948D8B007}" type="datetimeFigureOut">
               <a:rPr lang="en-GB" smtClean="0"/>
-              <a:t>05/02/2018</a:t>
+              <a:t>06/02/2018</a:t>
             </a:fld>
             <a:endParaRPr lang="en-GB"/>
           </a:p>
@@ -4600,7 +4614,7 @@
           <a:p>
             <a:fld id="{0E520F00-71AE-4099-9421-19B948D8B007}" type="datetimeFigureOut">
               <a:rPr lang="en-GB" smtClean="0"/>
-              <a:t>05/02/2018</a:t>
+              <a:t>06/02/2018</a:t>
             </a:fld>
             <a:endParaRPr lang="en-GB"/>
           </a:p>
@@ -4881,7 +4895,7 @@
           <a:p>
             <a:fld id="{0E520F00-71AE-4099-9421-19B948D8B007}" type="datetimeFigureOut">
               <a:rPr lang="en-GB" smtClean="0"/>
-              <a:t>05/02/2018</a:t>
+              <a:t>06/02/2018</a:t>
             </a:fld>
             <a:endParaRPr lang="en-GB"/>
           </a:p>
@@ -5162,7 +5176,7 @@
           <a:p>
             <a:fld id="{0E520F00-71AE-4099-9421-19B948D8B007}" type="datetimeFigureOut">
               <a:rPr lang="en-GB" smtClean="0"/>
-              <a:t>05/02/2018</a:t>
+              <a:t>06/02/2018</a:t>
             </a:fld>
             <a:endParaRPr lang="en-GB"/>
           </a:p>
@@ -5354,7 +5368,7 @@
           <a:p>
             <a:fld id="{0E520F00-71AE-4099-9421-19B948D8B007}" type="datetimeFigureOut">
               <a:rPr lang="en-GB" smtClean="0"/>
-              <a:t>05/02/2018</a:t>
+              <a:t>06/02/2018</a:t>
             </a:fld>
             <a:endParaRPr lang="en-GB"/>
           </a:p>
@@ -5615,7 +5629,7 @@
           <a:p>
             <a:fld id="{0E520F00-71AE-4099-9421-19B948D8B007}" type="datetimeFigureOut">
               <a:rPr lang="en-GB" smtClean="0"/>
-              <a:t>05/02/2018</a:t>
+              <a:t>06/02/2018</a:t>
             </a:fld>
             <a:endParaRPr lang="en-GB"/>
           </a:p>
@@ -6097,7 +6111,7 @@
           <a:p>
             <a:fld id="{0E520F00-71AE-4099-9421-19B948D8B007}" type="datetimeFigureOut">
               <a:rPr lang="en-GB" smtClean="0"/>
-              <a:t>05/02/2018</a:t>
+              <a:t>06/02/2018</a:t>
             </a:fld>
             <a:endParaRPr lang="en-GB"/>
           </a:p>
@@ -6291,7 +6305,7 @@
           <a:p>
             <a:fld id="{0E520F00-71AE-4099-9421-19B948D8B007}" type="datetimeFigureOut">
               <a:rPr lang="en-GB" smtClean="0"/>
-              <a:t>05/02/2018</a:t>
+              <a:t>06/02/2018</a:t>
             </a:fld>
             <a:endParaRPr lang="en-GB"/>
           </a:p>
@@ -6837,7 +6851,7 @@
           <a:p>
             <a:fld id="{0E520F00-71AE-4099-9421-19B948D8B007}" type="datetimeFigureOut">
               <a:rPr lang="en-GB" smtClean="0"/>
-              <a:t>05/02/2018</a:t>
+              <a:t>06/02/2018</a:t>
             </a:fld>
             <a:endParaRPr lang="en-GB"/>
           </a:p>
@@ -7668,7 +7682,7 @@
           <a:p>
             <a:fld id="{0E520F00-71AE-4099-9421-19B948D8B007}" type="datetimeFigureOut">
               <a:rPr lang="en-GB" smtClean="0"/>
-              <a:t>05/02/2018</a:t>
+              <a:t>06/02/2018</a:t>
             </a:fld>
             <a:endParaRPr lang="en-GB"/>
           </a:p>
@@ -7838,7 +7852,7 @@
           <a:p>
             <a:fld id="{0E520F00-71AE-4099-9421-19B948D8B007}" type="datetimeFigureOut">
               <a:rPr lang="en-GB" smtClean="0"/>
-              <a:t>05/02/2018</a:t>
+              <a:t>06/02/2018</a:t>
             </a:fld>
             <a:endParaRPr lang="en-GB"/>
           </a:p>
@@ -8018,7 +8032,7 @@
           <a:p>
             <a:fld id="{0E520F00-71AE-4099-9421-19B948D8B007}" type="datetimeFigureOut">
               <a:rPr lang="en-GB" smtClean="0"/>
-              <a:t>05/02/2018</a:t>
+              <a:t>06/02/2018</a:t>
             </a:fld>
             <a:endParaRPr lang="en-GB"/>
           </a:p>
@@ -8254,7 +8268,7 @@
           <a:p>
             <a:fld id="{0E520F00-71AE-4099-9421-19B948D8B007}" type="datetimeFigureOut">
               <a:rPr lang="en-GB" smtClean="0"/>
-              <a:t>05/02/2018</a:t>
+              <a:t>06/02/2018</a:t>
             </a:fld>
             <a:endParaRPr lang="en-GB"/>
           </a:p>
@@ -8636,7 +8650,7 @@
           <a:p>
             <a:fld id="{0E520F00-71AE-4099-9421-19B948D8B007}" type="datetimeFigureOut">
               <a:rPr lang="en-GB" smtClean="0"/>
-              <a:t>05/02/2018</a:t>
+              <a:t>06/02/2018</a:t>
             </a:fld>
             <a:endParaRPr lang="en-GB"/>
           </a:p>
@@ -8754,7 +8768,7 @@
           <a:p>
             <a:fld id="{0E520F00-71AE-4099-9421-19B948D8B007}" type="datetimeFigureOut">
               <a:rPr lang="en-GB" smtClean="0"/>
-              <a:t>05/02/2018</a:t>
+              <a:t>06/02/2018</a:t>
             </a:fld>
             <a:endParaRPr lang="en-GB"/>
           </a:p>
@@ -8849,7 +8863,7 @@
           <a:p>
             <a:fld id="{0E520F00-71AE-4099-9421-19B948D8B007}" type="datetimeFigureOut">
               <a:rPr lang="en-GB" smtClean="0"/>
-              <a:t>05/02/2018</a:t>
+              <a:t>06/02/2018</a:t>
             </a:fld>
             <a:endParaRPr lang="en-GB"/>
           </a:p>
@@ -9104,7 +9118,7 @@
           <a:p>
             <a:fld id="{0E520F00-71AE-4099-9421-19B948D8B007}" type="datetimeFigureOut">
               <a:rPr lang="en-GB" smtClean="0"/>
-              <a:t>05/02/2018</a:t>
+              <a:t>06/02/2018</a:t>
             </a:fld>
             <a:endParaRPr lang="en-GB"/>
           </a:p>
@@ -9387,7 +9401,7 @@
           <a:p>
             <a:fld id="{0E520F00-71AE-4099-9421-19B948D8B007}" type="datetimeFigureOut">
               <a:rPr lang="en-GB" smtClean="0"/>
-              <a:t>05/02/2018</a:t>
+              <a:t>06/02/2018</a:t>
             </a:fld>
             <a:endParaRPr lang="en-GB"/>
           </a:p>
@@ -9452,9 +9466,37 @@
 <p:sldMaster xmlns:a="http://schemas.openxmlformats.org/drawingml/2006/main" xmlns:r="http://schemas.openxmlformats.org/officeDocument/2006/relationships" xmlns:p="http://schemas.openxmlformats.org/presentationml/2006/main">
   <p:cSld>
     <p:bg>
-      <p:bgRef idx="1002">
-        <a:schemeClr val="bg2"/>
-      </p:bgRef>
+      <p:bgPr>
+        <a:gradFill flip="none" rotWithShape="1">
+          <a:gsLst>
+            <a:gs pos="0">
+              <a:schemeClr val="accent1">
+                <a:lumMod val="89000"/>
+              </a:schemeClr>
+            </a:gs>
+            <a:gs pos="23000">
+              <a:schemeClr val="accent1">
+                <a:lumMod val="89000"/>
+              </a:schemeClr>
+            </a:gs>
+            <a:gs pos="69000">
+              <a:schemeClr val="accent1">
+                <a:lumMod val="75000"/>
+              </a:schemeClr>
+            </a:gs>
+            <a:gs pos="97000">
+              <a:schemeClr val="accent1">
+                <a:lumMod val="70000"/>
+              </a:schemeClr>
+            </a:gs>
+          </a:gsLst>
+          <a:path path="circle">
+            <a:fillToRect l="50000" t="50000" r="50000" b="50000"/>
+          </a:path>
+          <a:tileRect/>
+        </a:gradFill>
+        <a:effectLst/>
+      </p:bgPr>
     </p:bg>
     <p:spTree>
       <p:nvGrpSpPr>
@@ -9793,7 +9835,7 @@
           <a:p>
             <a:fld id="{0E520F00-71AE-4099-9421-19B948D8B007}" type="datetimeFigureOut">
               <a:rPr lang="en-GB" smtClean="0"/>
-              <a:t>05/02/2018</a:t>
+              <a:t>06/02/2018</a:t>
             </a:fld>
             <a:endParaRPr lang="en-GB"/>
           </a:p>
@@ -10316,15 +10358,34 @@
   <p:cSld>
     <p:bg>
       <p:bgPr>
-        <a:blipFill dpi="0" rotWithShape="1">
-          <a:blip r:embed="rId19">
-            <a:lum/>
-          </a:blip>
-          <a:srcRect/>
-          <a:stretch>
-            <a:fillRect/>
-          </a:stretch>
-        </a:blipFill>
+        <a:gradFill flip="none" rotWithShape="1">
+          <a:gsLst>
+            <a:gs pos="0">
+              <a:schemeClr val="accent1">
+                <a:lumMod val="89000"/>
+              </a:schemeClr>
+            </a:gs>
+            <a:gs pos="23000">
+              <a:schemeClr val="accent1">
+                <a:lumMod val="89000"/>
+              </a:schemeClr>
+            </a:gs>
+            <a:gs pos="69000">
+              <a:schemeClr val="accent1">
+                <a:lumMod val="75000"/>
+              </a:schemeClr>
+            </a:gs>
+            <a:gs pos="97000">
+              <a:schemeClr val="accent1">
+                <a:lumMod val="70000"/>
+              </a:schemeClr>
+            </a:gs>
+          </a:gsLst>
+          <a:path path="circle">
+            <a:fillToRect l="50000" t="50000" r="50000" b="50000"/>
+          </a:path>
+          <a:tileRect/>
+        </a:gradFill>
         <a:effectLst/>
       </p:bgPr>
     </p:bg>
@@ -10490,7 +10551,7 @@
           <a:p>
             <a:fld id="{0E520F00-71AE-4099-9421-19B948D8B007}" type="datetimeFigureOut">
               <a:rPr lang="en-GB" smtClean="0"/>
-              <a:t>05/02/2018</a:t>
+              <a:t>06/02/2018</a:t>
             </a:fld>
             <a:endParaRPr lang="en-GB"/>
           </a:p>
@@ -11038,158 +11099,31 @@
 <file path=ppt/slides/slide1.xml><?xml version="1.0" encoding="utf-8"?>
 <p:sld xmlns:a="http://schemas.openxmlformats.org/drawingml/2006/main" xmlns:r="http://schemas.openxmlformats.org/officeDocument/2006/relationships" xmlns:p="http://schemas.openxmlformats.org/presentationml/2006/main">
   <p:cSld>
-    <p:spTree>
-      <p:nvGrpSpPr>
-        <p:cNvPr id="1" name=""/>
-        <p:cNvGrpSpPr/>
-        <p:nvPr/>
-      </p:nvGrpSpPr>
-      <p:grpSpPr>
-        <a:xfrm>
-          <a:off x="0" y="0"/>
-          <a:ext cx="0" cy="0"/>
-          <a:chOff x="0" y="0"/>
-          <a:chExt cx="0" cy="0"/>
-        </a:xfrm>
-      </p:grpSpPr>
-      <p:sp>
-        <p:nvSpPr>
-          <p:cNvPr id="2" name="Title 1">
-            <a:extLst>
-              <a:ext uri="{FF2B5EF4-FFF2-40B4-BE49-F238E27FC236}">
-                <a16:creationId xmlns:a16="http://schemas.microsoft.com/office/drawing/2014/main" id="{300D9432-7D5F-4F9E-86B6-9412AB6B4F19}"/>
-              </a:ext>
-            </a:extLst>
-          </p:cNvPr>
-          <p:cNvSpPr>
-            <a:spLocks noGrp="1"/>
-          </p:cNvSpPr>
-          <p:nvPr>
-            <p:ph type="ctrTitle"/>
-          </p:nvPr>
-        </p:nvSpPr>
-        <p:spPr/>
-        <p:txBody>
-          <a:bodyPr/>
-          <a:lstStyle/>
-          <a:p>
-            <a:r>
-              <a:rPr lang="en-GB" dirty="0"/>
-              <a:t>LEVEL 4 &amp; 5</a:t>
-            </a:r>
-            <a:br>
-              <a:rPr lang="en-GB" dirty="0"/>
-            </a:br>
-            <a:r>
-              <a:rPr lang="en-GB" dirty="0"/>
-              <a:t>Group 2	</a:t>
-            </a:r>
-            <a:br>
-              <a:rPr lang="en-GB" dirty="0"/>
-            </a:br>
-            <a:endParaRPr lang="en-GB" dirty="0"/>
-          </a:p>
-        </p:txBody>
-      </p:sp>
-      <p:sp>
-        <p:nvSpPr>
-          <p:cNvPr id="3" name="Subtitle 2">
-            <a:extLst>
-              <a:ext uri="{FF2B5EF4-FFF2-40B4-BE49-F238E27FC236}">
-                <a16:creationId xmlns:a16="http://schemas.microsoft.com/office/drawing/2014/main" id="{44FBAC67-89D3-4FA2-87EF-4E5CD2B2C731}"/>
-              </a:ext>
-            </a:extLst>
-          </p:cNvPr>
-          <p:cNvSpPr>
-            <a:spLocks noGrp="1"/>
-          </p:cNvSpPr>
-          <p:nvPr>
-            <p:ph type="subTitle" idx="1"/>
-          </p:nvPr>
-        </p:nvSpPr>
-        <p:spPr/>
-        <p:txBody>
-          <a:bodyPr>
-            <a:normAutofit/>
-          </a:bodyPr>
-          <a:lstStyle/>
-          <a:p>
-            <a:r>
-              <a:rPr lang="en-GB" dirty="0"/>
-              <a:t>Willoughby Axtell </a:t>
-            </a:r>
-          </a:p>
-          <a:p>
-            <a:r>
-              <a:rPr lang="en-GB" dirty="0"/>
-              <a:t>Daniel Beales</a:t>
-            </a:r>
-          </a:p>
-          <a:p>
-            <a:r>
-              <a:rPr lang="en-GB" dirty="0"/>
-              <a:t>Kyle </a:t>
-            </a:r>
-            <a:r>
-              <a:rPr lang="en-GB" dirty="0" err="1"/>
-              <a:t>Bodin</a:t>
-            </a:r>
-            <a:endParaRPr lang="en-GB" dirty="0"/>
-          </a:p>
-          <a:p>
-            <a:r>
-              <a:rPr lang="en-GB" dirty="0"/>
-              <a:t>James </a:t>
-            </a:r>
-            <a:r>
-              <a:rPr lang="en-GB" dirty="0" err="1"/>
-              <a:t>Macleanan</a:t>
-            </a:r>
-            <a:r>
-              <a:rPr lang="en-GB" dirty="0"/>
-              <a:t> </a:t>
-            </a:r>
-          </a:p>
-        </p:txBody>
-      </p:sp>
-    </p:spTree>
-    <p:extLst>
-      <p:ext uri="{BB962C8B-B14F-4D97-AF65-F5344CB8AC3E}">
-        <p14:creationId xmlns:p14="http://schemas.microsoft.com/office/powerpoint/2010/main" val="3765559061"/>
-      </p:ext>
-    </p:extLst>
-  </p:cSld>
-  <p:clrMapOvr>
-    <a:masterClrMapping/>
-  </p:clrMapOvr>
-</p:sld>
-</file>
-
-<file path=ppt/slides/slide2.xml><?xml version="1.0" encoding="utf-8"?>
-<p:sld xmlns:a="http://schemas.openxmlformats.org/drawingml/2006/main" xmlns:r="http://schemas.openxmlformats.org/officeDocument/2006/relationships" xmlns:p="http://schemas.openxmlformats.org/presentationml/2006/main">
-  <p:cSld>
     <p:bg>
       <p:bgPr>
         <a:gradFill flip="none" rotWithShape="1">
           <a:gsLst>
             <a:gs pos="0">
-              <a:schemeClr val="accent1">
-                <a:lumMod val="89000"/>
+              <a:schemeClr val="bg2">
+                <a:lumMod val="40000"/>
               </a:schemeClr>
             </a:gs>
             <a:gs pos="23000">
               <a:schemeClr val="accent1">
-                <a:lumMod val="89000"/>
+                <a:lumMod val="77000"/>
+                <a:lumOff val="23000"/>
               </a:schemeClr>
             </a:gs>
             <a:gs pos="69000">
               <a:schemeClr val="accent1">
-                <a:lumMod val="75000"/>
+                <a:lumMod val="50000"/>
+                <a:lumOff val="50000"/>
               </a:schemeClr>
             </a:gs>
             <a:gs pos="97000">
               <a:schemeClr val="accent1">
-                <a:lumMod val="70000"/>
+                <a:lumMod val="63000"/>
+                <a:lumOff val="37000"/>
               </a:schemeClr>
             </a:gs>
           </a:gsLst>
@@ -11220,6 +11154,277 @@
           <p:cNvPr id="2" name="Title 1">
             <a:extLst>
               <a:ext uri="{FF2B5EF4-FFF2-40B4-BE49-F238E27FC236}">
+                <a16:creationId xmlns:a16="http://schemas.microsoft.com/office/drawing/2014/main" id="{300D9432-7D5F-4F9E-86B6-9412AB6B4F19}"/>
+              </a:ext>
+            </a:extLst>
+          </p:cNvPr>
+          <p:cNvSpPr>
+            <a:spLocks noGrp="1"/>
+          </p:cNvSpPr>
+          <p:nvPr>
+            <p:ph type="ctrTitle"/>
+          </p:nvPr>
+        </p:nvSpPr>
+        <p:spPr/>
+        <p:txBody>
+          <a:bodyPr/>
+          <a:lstStyle/>
+          <a:p>
+            <a:r>
+              <a:rPr lang="en-GB" dirty="0"/>
+              <a:t>LEVEL 4 &amp; 5</a:t>
+            </a:r>
+            <a:br>
+              <a:rPr lang="en-GB" dirty="0"/>
+            </a:br>
+            <a:r>
+              <a:rPr lang="en-GB" dirty="0"/>
+              <a:t>Group 2	</a:t>
+            </a:r>
+            <a:br>
+              <a:rPr lang="en-GB" dirty="0"/>
+            </a:br>
+            <a:endParaRPr lang="en-GB" dirty="0"/>
+          </a:p>
+        </p:txBody>
+      </p:sp>
+      <p:sp>
+        <p:nvSpPr>
+          <p:cNvPr id="3" name="Subtitle 2">
+            <a:extLst>
+              <a:ext uri="{FF2B5EF4-FFF2-40B4-BE49-F238E27FC236}">
+                <a16:creationId xmlns:a16="http://schemas.microsoft.com/office/drawing/2014/main" id="{44FBAC67-89D3-4FA2-87EF-4E5CD2B2C731}"/>
+              </a:ext>
+            </a:extLst>
+          </p:cNvPr>
+          <p:cNvSpPr>
+            <a:spLocks noGrp="1"/>
+          </p:cNvSpPr>
+          <p:nvPr>
+            <p:ph type="subTitle" idx="1"/>
+          </p:nvPr>
+        </p:nvSpPr>
+        <p:spPr/>
+        <p:txBody>
+          <a:bodyPr>
+            <a:normAutofit/>
+          </a:bodyPr>
+          <a:lstStyle/>
+          <a:p>
+            <a:r>
+              <a:rPr lang="en-GB" dirty="0"/>
+              <a:t>Willoughby Axtell </a:t>
+            </a:r>
+          </a:p>
+          <a:p>
+            <a:r>
+              <a:rPr lang="en-GB" dirty="0"/>
+              <a:t>Daniel Beales</a:t>
+            </a:r>
+          </a:p>
+          <a:p>
+            <a:r>
+              <a:rPr lang="en-GB" dirty="0"/>
+              <a:t>Kyle </a:t>
+            </a:r>
+            <a:r>
+              <a:rPr lang="en-GB" dirty="0" err="1"/>
+              <a:t>Bodin</a:t>
+            </a:r>
+            <a:endParaRPr lang="en-GB" dirty="0"/>
+          </a:p>
+          <a:p>
+            <a:r>
+              <a:rPr lang="en-GB" dirty="0"/>
+              <a:t>James </a:t>
+            </a:r>
+            <a:r>
+              <a:rPr lang="en-GB" dirty="0" err="1"/>
+              <a:t>Macleanan</a:t>
+            </a:r>
+            <a:r>
+              <a:rPr lang="en-GB" dirty="0"/>
+              <a:t> </a:t>
+            </a:r>
+          </a:p>
+        </p:txBody>
+      </p:sp>
+    </p:spTree>
+    <p:extLst>
+      <p:ext uri="{BB962C8B-B14F-4D97-AF65-F5344CB8AC3E}">
+        <p14:creationId xmlns:p14="http://schemas.microsoft.com/office/powerpoint/2010/main" val="3765559061"/>
+      </p:ext>
+    </p:extLst>
+  </p:cSld>
+  <p:clrMapOvr>
+    <a:masterClrMapping/>
+  </p:clrMapOvr>
+</p:sld>
+</file>
+
+<file path=ppt/slides/slide10.xml><?xml version="1.0" encoding="utf-8"?>
+<p:sld xmlns:a="http://schemas.openxmlformats.org/drawingml/2006/main" xmlns:r="http://schemas.openxmlformats.org/officeDocument/2006/relationships" xmlns:p="http://schemas.openxmlformats.org/presentationml/2006/main">
+  <p:cSld>
+    <p:spTree>
+      <p:nvGrpSpPr>
+        <p:cNvPr id="1" name=""/>
+        <p:cNvGrpSpPr/>
+        <p:nvPr/>
+      </p:nvGrpSpPr>
+      <p:grpSpPr>
+        <a:xfrm>
+          <a:off x="0" y="0"/>
+          <a:ext cx="0" cy="0"/>
+          <a:chOff x="0" y="0"/>
+          <a:chExt cx="0" cy="0"/>
+        </a:xfrm>
+      </p:grpSpPr>
+      <p:sp>
+        <p:nvSpPr>
+          <p:cNvPr id="2" name="Title 1">
+            <a:extLst>
+              <a:ext uri="{FF2B5EF4-FFF2-40B4-BE49-F238E27FC236}">
+                <a16:creationId xmlns:a16="http://schemas.microsoft.com/office/drawing/2014/main" id="{5F13B6D4-24BE-42B7-B0A1-A5D77BAFE603}"/>
+              </a:ext>
+            </a:extLst>
+          </p:cNvPr>
+          <p:cNvSpPr>
+            <a:spLocks noGrp="1"/>
+          </p:cNvSpPr>
+          <p:nvPr>
+            <p:ph type="title"/>
+          </p:nvPr>
+        </p:nvSpPr>
+        <p:spPr/>
+        <p:txBody>
+          <a:bodyPr/>
+          <a:lstStyle/>
+          <a:p>
+            <a:r>
+              <a:rPr lang="en-GB" dirty="0"/>
+              <a:t>Challenges</a:t>
+            </a:r>
+          </a:p>
+        </p:txBody>
+      </p:sp>
+      <p:sp>
+        <p:nvSpPr>
+          <p:cNvPr id="3" name="Content Placeholder 2">
+            <a:extLst>
+              <a:ext uri="{FF2B5EF4-FFF2-40B4-BE49-F238E27FC236}">
+                <a16:creationId xmlns:a16="http://schemas.microsoft.com/office/drawing/2014/main" id="{5C5D55C8-0D73-4C1A-A8A1-90A3648CA459}"/>
+              </a:ext>
+            </a:extLst>
+          </p:cNvPr>
+          <p:cNvSpPr>
+            <a:spLocks noGrp="1"/>
+          </p:cNvSpPr>
+          <p:nvPr>
+            <p:ph idx="1"/>
+          </p:nvPr>
+        </p:nvSpPr>
+        <p:spPr/>
+        <p:txBody>
+          <a:bodyPr/>
+          <a:lstStyle/>
+          <a:p>
+            <a:endParaRPr lang="en-GB"/>
+          </a:p>
+        </p:txBody>
+      </p:sp>
+    </p:spTree>
+    <p:extLst>
+      <p:ext uri="{BB962C8B-B14F-4D97-AF65-F5344CB8AC3E}">
+        <p14:creationId xmlns:p14="http://schemas.microsoft.com/office/powerpoint/2010/main" val="3215632618"/>
+      </p:ext>
+    </p:extLst>
+  </p:cSld>
+  <p:clrMapOvr>
+    <a:masterClrMapping/>
+  </p:clrMapOvr>
+</p:sld>
+</file>
+
+<file path=ppt/slides/slide11.xml><?xml version="1.0" encoding="utf-8"?>
+<p:sld xmlns:a="http://schemas.openxmlformats.org/drawingml/2006/main" xmlns:r="http://schemas.openxmlformats.org/officeDocument/2006/relationships" xmlns:p="http://schemas.openxmlformats.org/presentationml/2006/main">
+  <p:cSld>
+    <p:spTree>
+      <p:nvGrpSpPr>
+        <p:cNvPr id="1" name=""/>
+        <p:cNvGrpSpPr/>
+        <p:nvPr/>
+      </p:nvGrpSpPr>
+      <p:grpSpPr>
+        <a:xfrm>
+          <a:off x="0" y="0"/>
+          <a:ext cx="0" cy="0"/>
+          <a:chOff x="0" y="0"/>
+          <a:chExt cx="0" cy="0"/>
+        </a:xfrm>
+      </p:grpSpPr>
+      <p:sp>
+        <p:nvSpPr>
+          <p:cNvPr id="2" name="Title 1">
+            <a:extLst>
+              <a:ext uri="{FF2B5EF4-FFF2-40B4-BE49-F238E27FC236}">
+                <a16:creationId xmlns:a16="http://schemas.microsoft.com/office/drawing/2014/main" id="{5B07ACBD-0570-4570-A31D-B79D49A6BB4F}"/>
+              </a:ext>
+            </a:extLst>
+          </p:cNvPr>
+          <p:cNvSpPr>
+            <a:spLocks noGrp="1"/>
+          </p:cNvSpPr>
+          <p:nvPr>
+            <p:ph type="title"/>
+          </p:nvPr>
+        </p:nvSpPr>
+        <p:spPr/>
+        <p:txBody>
+          <a:bodyPr/>
+          <a:lstStyle/>
+          <a:p>
+            <a:r>
+              <a:rPr lang="en-GB" dirty="0"/>
+              <a:t>Any Questions</a:t>
+            </a:r>
+          </a:p>
+        </p:txBody>
+      </p:sp>
+    </p:spTree>
+    <p:extLst>
+      <p:ext uri="{BB962C8B-B14F-4D97-AF65-F5344CB8AC3E}">
+        <p14:creationId xmlns:p14="http://schemas.microsoft.com/office/powerpoint/2010/main" val="3403769163"/>
+      </p:ext>
+    </p:extLst>
+  </p:cSld>
+  <p:clrMapOvr>
+    <a:masterClrMapping/>
+  </p:clrMapOvr>
+</p:sld>
+</file>
+
+<file path=ppt/slides/slide2.xml><?xml version="1.0" encoding="utf-8"?>
+<p:sld xmlns:a="http://schemas.openxmlformats.org/drawingml/2006/main" xmlns:r="http://schemas.openxmlformats.org/officeDocument/2006/relationships" xmlns:p="http://schemas.openxmlformats.org/presentationml/2006/main">
+  <p:cSld>
+    <p:spTree>
+      <p:nvGrpSpPr>
+        <p:cNvPr id="1" name=""/>
+        <p:cNvGrpSpPr/>
+        <p:nvPr/>
+      </p:nvGrpSpPr>
+      <p:grpSpPr>
+        <a:xfrm>
+          <a:off x="0" y="0"/>
+          <a:ext cx="0" cy="0"/>
+          <a:chOff x="0" y="0"/>
+          <a:chExt cx="0" cy="0"/>
+        </a:xfrm>
+      </p:grpSpPr>
+      <p:sp>
+        <p:nvSpPr>
+          <p:cNvPr id="2" name="Title 1">
+            <a:extLst>
+              <a:ext uri="{FF2B5EF4-FFF2-40B4-BE49-F238E27FC236}">
                 <a16:creationId xmlns:a16="http://schemas.microsoft.com/office/drawing/2014/main" id="{CE3C858C-A39A-4674-A79F-97B516DBA765}"/>
               </a:ext>
             </a:extLst>
@@ -11236,7 +11441,10 @@
           <a:bodyPr/>
           <a:lstStyle/>
           <a:p>
-            <a:endParaRPr lang="en-GB" dirty="0"/>
+            <a:r>
+              <a:rPr lang="en-GB" dirty="0"/>
+              <a:t>Brief Requirements</a:t>
+            </a:r>
           </a:p>
         </p:txBody>
       </p:sp>
@@ -11269,6 +11477,588 @@
     <p:extLst>
       <p:ext uri="{BB962C8B-B14F-4D97-AF65-F5344CB8AC3E}">
         <p14:creationId xmlns:p14="http://schemas.microsoft.com/office/powerpoint/2010/main" val="2992699020"/>
+      </p:ext>
+    </p:extLst>
+  </p:cSld>
+  <p:clrMapOvr>
+    <a:masterClrMapping/>
+  </p:clrMapOvr>
+</p:sld>
+</file>
+
+<file path=ppt/slides/slide3.xml><?xml version="1.0" encoding="utf-8"?>
+<p:sld xmlns:a="http://schemas.openxmlformats.org/drawingml/2006/main" xmlns:r="http://schemas.openxmlformats.org/officeDocument/2006/relationships" xmlns:p="http://schemas.openxmlformats.org/presentationml/2006/main">
+  <p:cSld>
+    <p:spTree>
+      <p:nvGrpSpPr>
+        <p:cNvPr id="1" name=""/>
+        <p:cNvGrpSpPr/>
+        <p:nvPr/>
+      </p:nvGrpSpPr>
+      <p:grpSpPr>
+        <a:xfrm>
+          <a:off x="0" y="0"/>
+          <a:ext cx="0" cy="0"/>
+          <a:chOff x="0" y="0"/>
+          <a:chExt cx="0" cy="0"/>
+        </a:xfrm>
+      </p:grpSpPr>
+      <p:sp>
+        <p:nvSpPr>
+          <p:cNvPr id="2" name="Title 1">
+            <a:extLst>
+              <a:ext uri="{FF2B5EF4-FFF2-40B4-BE49-F238E27FC236}">
+                <a16:creationId xmlns:a16="http://schemas.microsoft.com/office/drawing/2014/main" id="{79FC9EE2-5642-44D1-B5DE-3044B5F7FC80}"/>
+              </a:ext>
+            </a:extLst>
+          </p:cNvPr>
+          <p:cNvSpPr>
+            <a:spLocks noGrp="1"/>
+          </p:cNvSpPr>
+          <p:nvPr>
+            <p:ph type="title"/>
+          </p:nvPr>
+        </p:nvSpPr>
+        <p:spPr/>
+        <p:txBody>
+          <a:bodyPr/>
+          <a:lstStyle/>
+          <a:p>
+            <a:r>
+              <a:rPr lang="en-GB" dirty="0"/>
+              <a:t>The Demographic</a:t>
+            </a:r>
+          </a:p>
+        </p:txBody>
+      </p:sp>
+      <p:sp>
+        <p:nvSpPr>
+          <p:cNvPr id="3" name="Content Placeholder 2">
+            <a:extLst>
+              <a:ext uri="{FF2B5EF4-FFF2-40B4-BE49-F238E27FC236}">
+                <a16:creationId xmlns:a16="http://schemas.microsoft.com/office/drawing/2014/main" id="{4A20420F-F253-4A2A-AA9A-22AA736CA074}"/>
+              </a:ext>
+            </a:extLst>
+          </p:cNvPr>
+          <p:cNvSpPr>
+            <a:spLocks noGrp="1"/>
+          </p:cNvSpPr>
+          <p:nvPr>
+            <p:ph idx="1"/>
+          </p:nvPr>
+        </p:nvSpPr>
+        <p:spPr/>
+        <p:txBody>
+          <a:bodyPr/>
+          <a:lstStyle/>
+          <a:p>
+            <a:endParaRPr lang="en-GB"/>
+          </a:p>
+        </p:txBody>
+      </p:sp>
+    </p:spTree>
+    <p:extLst>
+      <p:ext uri="{BB962C8B-B14F-4D97-AF65-F5344CB8AC3E}">
+        <p14:creationId xmlns:p14="http://schemas.microsoft.com/office/powerpoint/2010/main" val="635853567"/>
+      </p:ext>
+    </p:extLst>
+  </p:cSld>
+  <p:clrMapOvr>
+    <a:masterClrMapping/>
+  </p:clrMapOvr>
+</p:sld>
+</file>
+
+<file path=ppt/slides/slide4.xml><?xml version="1.0" encoding="utf-8"?>
+<p:sld xmlns:a="http://schemas.openxmlformats.org/drawingml/2006/main" xmlns:r="http://schemas.openxmlformats.org/officeDocument/2006/relationships" xmlns:p="http://schemas.openxmlformats.org/presentationml/2006/main">
+  <p:cSld>
+    <p:spTree>
+      <p:nvGrpSpPr>
+        <p:cNvPr id="1" name=""/>
+        <p:cNvGrpSpPr/>
+        <p:nvPr/>
+      </p:nvGrpSpPr>
+      <p:grpSpPr>
+        <a:xfrm>
+          <a:off x="0" y="0"/>
+          <a:ext cx="0" cy="0"/>
+          <a:chOff x="0" y="0"/>
+          <a:chExt cx="0" cy="0"/>
+        </a:xfrm>
+      </p:grpSpPr>
+      <p:sp>
+        <p:nvSpPr>
+          <p:cNvPr id="2" name="Title 1">
+            <a:extLst>
+              <a:ext uri="{FF2B5EF4-FFF2-40B4-BE49-F238E27FC236}">
+                <a16:creationId xmlns:a16="http://schemas.microsoft.com/office/drawing/2014/main" id="{E783FF7B-F7FD-4754-B82E-AE63D8C35B0F}"/>
+              </a:ext>
+            </a:extLst>
+          </p:cNvPr>
+          <p:cNvSpPr>
+            <a:spLocks noGrp="1"/>
+          </p:cNvSpPr>
+          <p:nvPr>
+            <p:ph type="title"/>
+          </p:nvPr>
+        </p:nvSpPr>
+        <p:spPr/>
+        <p:txBody>
+          <a:bodyPr/>
+          <a:lstStyle/>
+          <a:p>
+            <a:r>
+              <a:rPr lang="en-GB" dirty="0"/>
+              <a:t>The Concept</a:t>
+            </a:r>
+          </a:p>
+        </p:txBody>
+      </p:sp>
+      <p:sp>
+        <p:nvSpPr>
+          <p:cNvPr id="3" name="Content Placeholder 2">
+            <a:extLst>
+              <a:ext uri="{FF2B5EF4-FFF2-40B4-BE49-F238E27FC236}">
+                <a16:creationId xmlns:a16="http://schemas.microsoft.com/office/drawing/2014/main" id="{49101832-D535-43E0-B578-535A4613FBE6}"/>
+              </a:ext>
+            </a:extLst>
+          </p:cNvPr>
+          <p:cNvSpPr>
+            <a:spLocks noGrp="1"/>
+          </p:cNvSpPr>
+          <p:nvPr>
+            <p:ph idx="1"/>
+          </p:nvPr>
+        </p:nvSpPr>
+        <p:spPr/>
+        <p:txBody>
+          <a:bodyPr/>
+          <a:lstStyle/>
+          <a:p>
+            <a:endParaRPr lang="en-GB"/>
+          </a:p>
+        </p:txBody>
+      </p:sp>
+    </p:spTree>
+    <p:extLst>
+      <p:ext uri="{BB962C8B-B14F-4D97-AF65-F5344CB8AC3E}">
+        <p14:creationId xmlns:p14="http://schemas.microsoft.com/office/powerpoint/2010/main" val="4257044477"/>
+      </p:ext>
+    </p:extLst>
+  </p:cSld>
+  <p:clrMapOvr>
+    <a:masterClrMapping/>
+  </p:clrMapOvr>
+</p:sld>
+</file>
+
+<file path=ppt/slides/slide5.xml><?xml version="1.0" encoding="utf-8"?>
+<p:sld xmlns:a="http://schemas.openxmlformats.org/drawingml/2006/main" xmlns:r="http://schemas.openxmlformats.org/officeDocument/2006/relationships" xmlns:p="http://schemas.openxmlformats.org/presentationml/2006/main">
+  <p:cSld>
+    <p:spTree>
+      <p:nvGrpSpPr>
+        <p:cNvPr id="1" name=""/>
+        <p:cNvGrpSpPr/>
+        <p:nvPr/>
+      </p:nvGrpSpPr>
+      <p:grpSpPr>
+        <a:xfrm>
+          <a:off x="0" y="0"/>
+          <a:ext cx="0" cy="0"/>
+          <a:chOff x="0" y="0"/>
+          <a:chExt cx="0" cy="0"/>
+        </a:xfrm>
+      </p:grpSpPr>
+      <p:sp>
+        <p:nvSpPr>
+          <p:cNvPr id="2" name="Title 1">
+            <a:extLst>
+              <a:ext uri="{FF2B5EF4-FFF2-40B4-BE49-F238E27FC236}">
+                <a16:creationId xmlns:a16="http://schemas.microsoft.com/office/drawing/2014/main" id="{DA084290-6BC9-46C1-8777-A65B4A4CEC1A}"/>
+              </a:ext>
+            </a:extLst>
+          </p:cNvPr>
+          <p:cNvSpPr>
+            <a:spLocks noGrp="1"/>
+          </p:cNvSpPr>
+          <p:nvPr>
+            <p:ph type="title"/>
+          </p:nvPr>
+        </p:nvSpPr>
+        <p:spPr/>
+        <p:txBody>
+          <a:bodyPr/>
+          <a:lstStyle/>
+          <a:p>
+            <a:r>
+              <a:rPr lang="en-GB" dirty="0"/>
+              <a:t>The Core Game Loop</a:t>
+            </a:r>
+          </a:p>
+        </p:txBody>
+      </p:sp>
+      <p:sp>
+        <p:nvSpPr>
+          <p:cNvPr id="3" name="Content Placeholder 2">
+            <a:extLst>
+              <a:ext uri="{FF2B5EF4-FFF2-40B4-BE49-F238E27FC236}">
+                <a16:creationId xmlns:a16="http://schemas.microsoft.com/office/drawing/2014/main" id="{88A8764E-DECF-4B34-B731-15F09FD2F8AE}"/>
+              </a:ext>
+            </a:extLst>
+          </p:cNvPr>
+          <p:cNvSpPr>
+            <a:spLocks noGrp="1"/>
+          </p:cNvSpPr>
+          <p:nvPr>
+            <p:ph idx="1"/>
+          </p:nvPr>
+        </p:nvSpPr>
+        <p:spPr/>
+        <p:txBody>
+          <a:bodyPr/>
+          <a:lstStyle/>
+          <a:p>
+            <a:endParaRPr lang="en-GB"/>
+          </a:p>
+        </p:txBody>
+      </p:sp>
+    </p:spTree>
+    <p:extLst>
+      <p:ext uri="{BB962C8B-B14F-4D97-AF65-F5344CB8AC3E}">
+        <p14:creationId xmlns:p14="http://schemas.microsoft.com/office/powerpoint/2010/main" val="2094043784"/>
+      </p:ext>
+    </p:extLst>
+  </p:cSld>
+  <p:clrMapOvr>
+    <a:masterClrMapping/>
+  </p:clrMapOvr>
+</p:sld>
+</file>
+
+<file path=ppt/slides/slide6.xml><?xml version="1.0" encoding="utf-8"?>
+<p:sld xmlns:a="http://schemas.openxmlformats.org/drawingml/2006/main" xmlns:r="http://schemas.openxmlformats.org/officeDocument/2006/relationships" xmlns:p="http://schemas.openxmlformats.org/presentationml/2006/main">
+  <p:cSld>
+    <p:spTree>
+      <p:nvGrpSpPr>
+        <p:cNvPr id="1" name=""/>
+        <p:cNvGrpSpPr/>
+        <p:nvPr/>
+      </p:nvGrpSpPr>
+      <p:grpSpPr>
+        <a:xfrm>
+          <a:off x="0" y="0"/>
+          <a:ext cx="0" cy="0"/>
+          <a:chOff x="0" y="0"/>
+          <a:chExt cx="0" cy="0"/>
+        </a:xfrm>
+      </p:grpSpPr>
+      <p:sp>
+        <p:nvSpPr>
+          <p:cNvPr id="2" name="Title 1">
+            <a:extLst>
+              <a:ext uri="{FF2B5EF4-FFF2-40B4-BE49-F238E27FC236}">
+                <a16:creationId xmlns:a16="http://schemas.microsoft.com/office/drawing/2014/main" id="{AFBCF69E-0B4D-4EDA-9AAA-D6C8BED7ACE1}"/>
+              </a:ext>
+            </a:extLst>
+          </p:cNvPr>
+          <p:cNvSpPr>
+            <a:spLocks noGrp="1"/>
+          </p:cNvSpPr>
+          <p:nvPr>
+            <p:ph type="title"/>
+          </p:nvPr>
+        </p:nvSpPr>
+        <p:spPr/>
+        <p:txBody>
+          <a:bodyPr/>
+          <a:lstStyle/>
+          <a:p>
+            <a:r>
+              <a:rPr lang="en-GB" dirty="0"/>
+              <a:t>The Theme</a:t>
+            </a:r>
+          </a:p>
+        </p:txBody>
+      </p:sp>
+      <p:sp>
+        <p:nvSpPr>
+          <p:cNvPr id="3" name="Content Placeholder 2">
+            <a:extLst>
+              <a:ext uri="{FF2B5EF4-FFF2-40B4-BE49-F238E27FC236}">
+                <a16:creationId xmlns:a16="http://schemas.microsoft.com/office/drawing/2014/main" id="{669A7E74-13B6-4A59-B016-A47BFF8C9D82}"/>
+              </a:ext>
+            </a:extLst>
+          </p:cNvPr>
+          <p:cNvSpPr>
+            <a:spLocks noGrp="1"/>
+          </p:cNvSpPr>
+          <p:nvPr>
+            <p:ph idx="1"/>
+          </p:nvPr>
+        </p:nvSpPr>
+        <p:spPr/>
+        <p:txBody>
+          <a:bodyPr/>
+          <a:lstStyle/>
+          <a:p>
+            <a:endParaRPr lang="en-GB"/>
+          </a:p>
+        </p:txBody>
+      </p:sp>
+    </p:spTree>
+    <p:extLst>
+      <p:ext uri="{BB962C8B-B14F-4D97-AF65-F5344CB8AC3E}">
+        <p14:creationId xmlns:p14="http://schemas.microsoft.com/office/powerpoint/2010/main" val="2956544879"/>
+      </p:ext>
+    </p:extLst>
+  </p:cSld>
+  <p:clrMapOvr>
+    <a:masterClrMapping/>
+  </p:clrMapOvr>
+</p:sld>
+</file>
+
+<file path=ppt/slides/slide7.xml><?xml version="1.0" encoding="utf-8"?>
+<p:sld xmlns:a="http://schemas.openxmlformats.org/drawingml/2006/main" xmlns:r="http://schemas.openxmlformats.org/officeDocument/2006/relationships" xmlns:p="http://schemas.openxmlformats.org/presentationml/2006/main">
+  <p:cSld>
+    <p:spTree>
+      <p:nvGrpSpPr>
+        <p:cNvPr id="1" name=""/>
+        <p:cNvGrpSpPr/>
+        <p:nvPr/>
+      </p:nvGrpSpPr>
+      <p:grpSpPr>
+        <a:xfrm>
+          <a:off x="0" y="0"/>
+          <a:ext cx="0" cy="0"/>
+          <a:chOff x="0" y="0"/>
+          <a:chExt cx="0" cy="0"/>
+        </a:xfrm>
+      </p:grpSpPr>
+      <p:sp>
+        <p:nvSpPr>
+          <p:cNvPr id="2" name="Title 1">
+            <a:extLst>
+              <a:ext uri="{FF2B5EF4-FFF2-40B4-BE49-F238E27FC236}">
+                <a16:creationId xmlns:a16="http://schemas.microsoft.com/office/drawing/2014/main" id="{75643F8F-44D2-4AC5-A692-6674E58191CA}"/>
+              </a:ext>
+            </a:extLst>
+          </p:cNvPr>
+          <p:cNvSpPr>
+            <a:spLocks noGrp="1"/>
+          </p:cNvSpPr>
+          <p:nvPr>
+            <p:ph type="title"/>
+          </p:nvPr>
+        </p:nvSpPr>
+        <p:spPr/>
+        <p:txBody>
+          <a:bodyPr/>
+          <a:lstStyle/>
+          <a:p>
+            <a:r>
+              <a:rPr lang="en-GB" dirty="0" err="1"/>
+              <a:t>Moodboards</a:t>
+            </a:r>
+            <a:endParaRPr lang="en-GB" dirty="0"/>
+          </a:p>
+        </p:txBody>
+      </p:sp>
+      <p:sp>
+        <p:nvSpPr>
+          <p:cNvPr id="3" name="Content Placeholder 2">
+            <a:extLst>
+              <a:ext uri="{FF2B5EF4-FFF2-40B4-BE49-F238E27FC236}">
+                <a16:creationId xmlns:a16="http://schemas.microsoft.com/office/drawing/2014/main" id="{A31FE515-C884-41DF-8A4C-3017C6AF847E}"/>
+              </a:ext>
+            </a:extLst>
+          </p:cNvPr>
+          <p:cNvSpPr>
+            <a:spLocks noGrp="1"/>
+          </p:cNvSpPr>
+          <p:nvPr>
+            <p:ph idx="1"/>
+          </p:nvPr>
+        </p:nvSpPr>
+        <p:spPr/>
+        <p:txBody>
+          <a:bodyPr/>
+          <a:lstStyle/>
+          <a:p>
+            <a:endParaRPr lang="en-GB"/>
+          </a:p>
+        </p:txBody>
+      </p:sp>
+    </p:spTree>
+    <p:extLst>
+      <p:ext uri="{BB962C8B-B14F-4D97-AF65-F5344CB8AC3E}">
+        <p14:creationId xmlns:p14="http://schemas.microsoft.com/office/powerpoint/2010/main" val="1118623560"/>
+      </p:ext>
+    </p:extLst>
+  </p:cSld>
+  <p:clrMapOvr>
+    <a:masterClrMapping/>
+  </p:clrMapOvr>
+</p:sld>
+</file>
+
+<file path=ppt/slides/slide8.xml><?xml version="1.0" encoding="utf-8"?>
+<p:sld xmlns:a="http://schemas.openxmlformats.org/drawingml/2006/main" xmlns:r="http://schemas.openxmlformats.org/officeDocument/2006/relationships" xmlns:p="http://schemas.openxmlformats.org/presentationml/2006/main">
+  <p:cSld>
+    <p:spTree>
+      <p:nvGrpSpPr>
+        <p:cNvPr id="1" name=""/>
+        <p:cNvGrpSpPr/>
+        <p:nvPr/>
+      </p:nvGrpSpPr>
+      <p:grpSpPr>
+        <a:xfrm>
+          <a:off x="0" y="0"/>
+          <a:ext cx="0" cy="0"/>
+          <a:chOff x="0" y="0"/>
+          <a:chExt cx="0" cy="0"/>
+        </a:xfrm>
+      </p:grpSpPr>
+      <p:sp>
+        <p:nvSpPr>
+          <p:cNvPr id="2" name="Title 1">
+            <a:extLst>
+              <a:ext uri="{FF2B5EF4-FFF2-40B4-BE49-F238E27FC236}">
+                <a16:creationId xmlns:a16="http://schemas.microsoft.com/office/drawing/2014/main" id="{A1720803-B071-4198-A0AC-8D769B6A8F6C}"/>
+              </a:ext>
+            </a:extLst>
+          </p:cNvPr>
+          <p:cNvSpPr>
+            <a:spLocks noGrp="1"/>
+          </p:cNvSpPr>
+          <p:nvPr>
+            <p:ph type="title"/>
+          </p:nvPr>
+        </p:nvSpPr>
+        <p:spPr/>
+        <p:txBody>
+          <a:bodyPr/>
+          <a:lstStyle/>
+          <a:p>
+            <a:r>
+              <a:rPr lang="en-GB" dirty="0"/>
+              <a:t>Our Research</a:t>
+            </a:r>
+          </a:p>
+        </p:txBody>
+      </p:sp>
+      <p:sp>
+        <p:nvSpPr>
+          <p:cNvPr id="3" name="Content Placeholder 2">
+            <a:extLst>
+              <a:ext uri="{FF2B5EF4-FFF2-40B4-BE49-F238E27FC236}">
+                <a16:creationId xmlns:a16="http://schemas.microsoft.com/office/drawing/2014/main" id="{AEE70A35-4B0D-4467-B259-A3F3DDC516B7}"/>
+              </a:ext>
+            </a:extLst>
+          </p:cNvPr>
+          <p:cNvSpPr>
+            <a:spLocks noGrp="1"/>
+          </p:cNvSpPr>
+          <p:nvPr>
+            <p:ph idx="1"/>
+          </p:nvPr>
+        </p:nvSpPr>
+        <p:spPr/>
+        <p:txBody>
+          <a:bodyPr/>
+          <a:lstStyle/>
+          <a:p>
+            <a:endParaRPr lang="en-GB"/>
+          </a:p>
+        </p:txBody>
+      </p:sp>
+    </p:spTree>
+    <p:extLst>
+      <p:ext uri="{BB962C8B-B14F-4D97-AF65-F5344CB8AC3E}">
+        <p14:creationId xmlns:p14="http://schemas.microsoft.com/office/powerpoint/2010/main" val="3796094944"/>
+      </p:ext>
+    </p:extLst>
+  </p:cSld>
+  <p:clrMapOvr>
+    <a:masterClrMapping/>
+  </p:clrMapOvr>
+</p:sld>
+</file>
+
+<file path=ppt/slides/slide9.xml><?xml version="1.0" encoding="utf-8"?>
+<p:sld xmlns:a="http://schemas.openxmlformats.org/drawingml/2006/main" xmlns:r="http://schemas.openxmlformats.org/officeDocument/2006/relationships" xmlns:p="http://schemas.openxmlformats.org/presentationml/2006/main">
+  <p:cSld>
+    <p:spTree>
+      <p:nvGrpSpPr>
+        <p:cNvPr id="1" name=""/>
+        <p:cNvGrpSpPr/>
+        <p:nvPr/>
+      </p:nvGrpSpPr>
+      <p:grpSpPr>
+        <a:xfrm>
+          <a:off x="0" y="0"/>
+          <a:ext cx="0" cy="0"/>
+          <a:chOff x="0" y="0"/>
+          <a:chExt cx="0" cy="0"/>
+        </a:xfrm>
+      </p:grpSpPr>
+      <p:sp>
+        <p:nvSpPr>
+          <p:cNvPr id="2" name="Title 1">
+            <a:extLst>
+              <a:ext uri="{FF2B5EF4-FFF2-40B4-BE49-F238E27FC236}">
+                <a16:creationId xmlns:a16="http://schemas.microsoft.com/office/drawing/2014/main" id="{BE38C30D-8746-4954-BF0C-CEB90A866307}"/>
+              </a:ext>
+            </a:extLst>
+          </p:cNvPr>
+          <p:cNvSpPr>
+            <a:spLocks noGrp="1"/>
+          </p:cNvSpPr>
+          <p:nvPr>
+            <p:ph type="title"/>
+          </p:nvPr>
+        </p:nvSpPr>
+        <p:spPr/>
+        <p:txBody>
+          <a:bodyPr/>
+          <a:lstStyle/>
+          <a:p>
+            <a:r>
+              <a:rPr lang="en-GB" dirty="0"/>
+              <a:t>Research Continued</a:t>
+            </a:r>
+          </a:p>
+        </p:txBody>
+      </p:sp>
+      <p:sp>
+        <p:nvSpPr>
+          <p:cNvPr id="3" name="Content Placeholder 2">
+            <a:extLst>
+              <a:ext uri="{FF2B5EF4-FFF2-40B4-BE49-F238E27FC236}">
+                <a16:creationId xmlns:a16="http://schemas.microsoft.com/office/drawing/2014/main" id="{F9B9960E-91C3-4227-BE91-E01160D49A65}"/>
+              </a:ext>
+            </a:extLst>
+          </p:cNvPr>
+          <p:cNvSpPr>
+            <a:spLocks noGrp="1"/>
+          </p:cNvSpPr>
+          <p:nvPr>
+            <p:ph idx="1"/>
+          </p:nvPr>
+        </p:nvSpPr>
+        <p:spPr/>
+        <p:txBody>
+          <a:bodyPr/>
+          <a:lstStyle/>
+          <a:p>
+            <a:endParaRPr lang="en-GB"/>
+          </a:p>
+        </p:txBody>
+      </p:sp>
+    </p:spTree>
+    <p:extLst>
+      <p:ext uri="{BB962C8B-B14F-4D97-AF65-F5344CB8AC3E}">
+        <p14:creationId xmlns:p14="http://schemas.microsoft.com/office/powerpoint/2010/main" val="1632926934"/>
       </p:ext>
     </p:extLst>
   </p:cSld>

</xml_diff>